<commit_message>
{UPDATE} capsule 002 , capsule 004, capsule 006
</commit_message>
<xml_diff>
--- a/thématique SI/004 Définir le SI/rsrc/Définir le SI.pptx
+++ b/thématique SI/004 Définir le SI/rsrc/Définir le SI.pptx
@@ -107,6 +107,11 @@
       </a:defRPr>
     </a:lvl9pPr>
   </p:defaultTextStyle>
+  <p:extLst>
+    <p:ext uri="{EFAFB233-063F-42B5-8137-9DF3F51BA10A}">
+      <p15:sldGuideLst xmlns:p15="http://schemas.microsoft.com/office/powerpoint/2012/main"/>
+    </p:ext>
+  </p:extLst>
 </p:presentation>
 </file>
 
@@ -192,7 +197,7 @@
           <a:p>
             <a:fld id="{9E4B8CC3-9485-4880-8638-69D0788376F3}" type="datetimeFigureOut">
               <a:rPr lang="fr-FR" smtClean="0"/>
-              <a:t>22/05/2023</a:t>
+              <a:t>25/05/2023</a:t>
             </a:fld>
             <a:endParaRPr lang="fr-FR"/>
           </a:p>
@@ -517,15 +522,7 @@
           <a:p>
             <a:r>
               <a:rPr lang="fr-FR" dirty="0"/>
-              <a:t>- </a:t>
-            </a:r>
-            <a:r>
-              <a:rPr lang="fr-FR"/>
-              <a:t>Ces éléments </a:t>
-            </a:r>
-            <a:r>
-              <a:rPr lang="fr-FR" dirty="0"/>
-              <a:t>sont bien en interaction. Par exemple, l'employé utilise une application au travers d'interfaces ; un ordinateur est déployé sur le réseau ; ou encore une règle de gestion est respectée au sein d'une application.</a:t>
+              <a:t>- Ces éléments sont bien en interaction. Par exemple, l'employé utilise une application au travers d'interfaces ; un ordinateur est déployé sur le réseau ; ou encore une règle de gestion est respectée au sein d'une application.</a:t>
             </a:r>
           </a:p>
           <a:p>
@@ -719,7 +716,7 @@
           <a:p>
             <a:fld id="{FB996DCB-1AB0-43FA-9D80-01B79EDB845C}" type="datetimeFigureOut">
               <a:rPr lang="fr-FR" smtClean="0"/>
-              <a:t>22/05/2023</a:t>
+              <a:t>25/05/2023</a:t>
             </a:fld>
             <a:endParaRPr lang="fr-FR"/>
           </a:p>
@@ -917,7 +914,7 @@
           <a:p>
             <a:fld id="{FB996DCB-1AB0-43FA-9D80-01B79EDB845C}" type="datetimeFigureOut">
               <a:rPr lang="fr-FR" smtClean="0"/>
-              <a:t>22/05/2023</a:t>
+              <a:t>25/05/2023</a:t>
             </a:fld>
             <a:endParaRPr lang="fr-FR"/>
           </a:p>
@@ -1125,7 +1122,7 @@
           <a:p>
             <a:fld id="{FB996DCB-1AB0-43FA-9D80-01B79EDB845C}" type="datetimeFigureOut">
               <a:rPr lang="fr-FR" smtClean="0"/>
-              <a:t>22/05/2023</a:t>
+              <a:t>25/05/2023</a:t>
             </a:fld>
             <a:endParaRPr lang="fr-FR"/>
           </a:p>
@@ -1323,7 +1320,7 @@
           <a:p>
             <a:fld id="{FB996DCB-1AB0-43FA-9D80-01B79EDB845C}" type="datetimeFigureOut">
               <a:rPr lang="fr-FR" smtClean="0"/>
-              <a:t>22/05/2023</a:t>
+              <a:t>25/05/2023</a:t>
             </a:fld>
             <a:endParaRPr lang="fr-FR"/>
           </a:p>
@@ -1598,7 +1595,7 @@
           <a:p>
             <a:fld id="{FB996DCB-1AB0-43FA-9D80-01B79EDB845C}" type="datetimeFigureOut">
               <a:rPr lang="fr-FR" smtClean="0"/>
-              <a:t>22/05/2023</a:t>
+              <a:t>25/05/2023</a:t>
             </a:fld>
             <a:endParaRPr lang="fr-FR"/>
           </a:p>
@@ -1863,7 +1860,7 @@
           <a:p>
             <a:fld id="{FB996DCB-1AB0-43FA-9D80-01B79EDB845C}" type="datetimeFigureOut">
               <a:rPr lang="fr-FR" smtClean="0"/>
-              <a:t>22/05/2023</a:t>
+              <a:t>25/05/2023</a:t>
             </a:fld>
             <a:endParaRPr lang="fr-FR"/>
           </a:p>
@@ -2275,7 +2272,7 @@
           <a:p>
             <a:fld id="{FB996DCB-1AB0-43FA-9D80-01B79EDB845C}" type="datetimeFigureOut">
               <a:rPr lang="fr-FR" smtClean="0"/>
-              <a:t>22/05/2023</a:t>
+              <a:t>25/05/2023</a:t>
             </a:fld>
             <a:endParaRPr lang="fr-FR"/>
           </a:p>
@@ -2416,7 +2413,7 @@
           <a:p>
             <a:fld id="{FB996DCB-1AB0-43FA-9D80-01B79EDB845C}" type="datetimeFigureOut">
               <a:rPr lang="fr-FR" smtClean="0"/>
-              <a:t>22/05/2023</a:t>
+              <a:t>25/05/2023</a:t>
             </a:fld>
             <a:endParaRPr lang="fr-FR"/>
           </a:p>
@@ -2529,7 +2526,7 @@
           <a:p>
             <a:fld id="{FB996DCB-1AB0-43FA-9D80-01B79EDB845C}" type="datetimeFigureOut">
               <a:rPr lang="fr-FR" smtClean="0"/>
-              <a:t>22/05/2023</a:t>
+              <a:t>25/05/2023</a:t>
             </a:fld>
             <a:endParaRPr lang="fr-FR"/>
           </a:p>
@@ -2840,7 +2837,7 @@
           <a:p>
             <a:fld id="{FB996DCB-1AB0-43FA-9D80-01B79EDB845C}" type="datetimeFigureOut">
               <a:rPr lang="fr-FR" smtClean="0"/>
-              <a:t>22/05/2023</a:t>
+              <a:t>25/05/2023</a:t>
             </a:fld>
             <a:endParaRPr lang="fr-FR"/>
           </a:p>
@@ -3128,7 +3125,7 @@
           <a:p>
             <a:fld id="{FB996DCB-1AB0-43FA-9D80-01B79EDB845C}" type="datetimeFigureOut">
               <a:rPr lang="fr-FR" smtClean="0"/>
-              <a:t>22/05/2023</a:t>
+              <a:t>25/05/2023</a:t>
             </a:fld>
             <a:endParaRPr lang="fr-FR"/>
           </a:p>
@@ -3369,7 +3366,7 @@
           <a:p>
             <a:fld id="{FB996DCB-1AB0-43FA-9D80-01B79EDB845C}" type="datetimeFigureOut">
               <a:rPr lang="fr-FR" smtClean="0"/>
-              <a:t>22/05/2023</a:t>
+              <a:t>25/05/2023</a:t>
             </a:fld>
             <a:endParaRPr lang="fr-FR"/>
           </a:p>
@@ -4356,11 +4353,11 @@
       </p:sp>
       <p:pic>
         <p:nvPicPr>
-          <p:cNvPr id="30" name="Soundly Voice Designer, Alain 19">
+          <p:cNvPr id="2" name="Soundly Voice Designer, Alain 27">
             <a:hlinkClick r:id="" action="ppaction://media"/>
             <a:extLst>
               <a:ext uri="{FF2B5EF4-FFF2-40B4-BE49-F238E27FC236}">
-                <a16:creationId xmlns:a16="http://schemas.microsoft.com/office/drawing/2014/main" id="{443B80DE-F06F-AC18-E22E-899DE64DFABC}"/>
+                <a16:creationId xmlns:a16="http://schemas.microsoft.com/office/drawing/2014/main" id="{17A92827-2980-34D3-1801-5AF1066C8A38}"/>
               </a:ext>
             </a:extLst>
           </p:cNvPr>
@@ -4384,8 +4381,8 @@
         </p:blipFill>
         <p:spPr>
           <a:xfrm>
-            <a:off x="10144935" y="3859823"/>
-            <a:ext cx="487362" cy="487362"/>
+            <a:off x="10230597" y="3827156"/>
+            <a:ext cx="487363" cy="487362"/>
           </a:xfrm>
           <a:prstGeom prst="rect">
             <a:avLst/>
@@ -4407,10 +4404,10 @@
   </p:clrMapOvr>
   <mc:AlternateContent xmlns:mc="http://schemas.openxmlformats.org/markup-compatibility/2006">
     <mc:Choice xmlns:p14="http://schemas.microsoft.com/office/powerpoint/2010/main" Requires="p14">
-      <p:transition spd="slow" p14:dur="2000" advTm="39903"/>
+      <p:transition spd="slow" p14:dur="2000" advTm="38860"/>
     </mc:Choice>
     <mc:Fallback>
-      <p:transition spd="slow" advTm="39903"/>
+      <p:transition spd="slow" advTm="38860"/>
     </mc:Fallback>
   </mc:AlternateContent>
   <p:timing>
@@ -4446,7 +4443,7 @@
                                       <p:cBhvr>
                                         <p:cTn id="6" dur="1" fill="hold"/>
                                         <p:tgtEl>
-                                          <p:spTgt spid="30"/>
+                                          <p:spTgt spid="2"/>
                                         </p:tgtEl>
                                       </p:cBhvr>
                                     </p:cmd>
@@ -5315,7 +5312,7 @@
                   </p:endCondLst>
                 </p:cTn>
                 <p:tgtEl>
-                  <p:spTgt spid="30"/>
+                  <p:spTgt spid="2"/>
                 </p:tgtEl>
               </p:cMediaNode>
             </p:audio>
@@ -5333,8 +5330,8 @@
   <p:extLst>
     <p:ext uri="{E180D4A7-C9FB-4DFB-919C-405C955672EB}">
       <p14:showEvtLst xmlns:p14="http://schemas.microsoft.com/office/powerpoint/2010/main">
-        <p14:playEvt time="750" objId="30"/>
-        <p14:stopEvt time="39201" objId="30"/>
+        <p14:playEvt time="86" objId="2"/>
+        <p14:stopEvt time="37911" objId="2"/>
       </p14:showEvtLst>
     </p:ext>
   </p:extLst>
@@ -5343,7 +5340,7 @@
 
 <file path=ppt/tags/tag1.xml><?xml version="1.0" encoding="utf-8"?>
 <p:tagLst xmlns:a="http://schemas.openxmlformats.org/drawingml/2006/main" xmlns:r="http://schemas.openxmlformats.org/officeDocument/2006/relationships" xmlns:p="http://schemas.openxmlformats.org/presentationml/2006/main">
-  <p:tag name="TIMING" val="|2.9|3.8|0.9|1.1|0.8|1|1.1|5.6|3.6|2.4|6.2|7.3"/>
+  <p:tag name="TIMING" val="|1.8|3.7|0.9|1.2|0.9|1.1|1|6|3.6|2.1|5.7|6.7"/>
 </p:tagLst>
 </file>
 

</xml_diff>